<commit_message>
Created Biological network diagram
</commit_message>
<xml_diff>
--- a/example_4/Optimus.pptx
+++ b/example_4/Optimus.pptx
@@ -304,7 +304,7 @@
           <a:p>
             <a:fld id="{554200E8-7467-5347-95AC-7B649ADDE46A}" type="datetimeFigureOut">
               <a:rPr lang="en-US" smtClean="0"/>
-              <a:t>8/17/2018</a:t>
+              <a:t>8/18/2018</a:t>
             </a:fld>
             <a:endParaRPr lang="en-US"/>
           </a:p>
@@ -474,7 +474,7 @@
           <a:p>
             <a:fld id="{554200E8-7467-5347-95AC-7B649ADDE46A}" type="datetimeFigureOut">
               <a:rPr lang="en-US" smtClean="0"/>
-              <a:t>8/17/2018</a:t>
+              <a:t>8/18/2018</a:t>
             </a:fld>
             <a:endParaRPr lang="en-US"/>
           </a:p>
@@ -654,7 +654,7 @@
           <a:p>
             <a:fld id="{554200E8-7467-5347-95AC-7B649ADDE46A}" type="datetimeFigureOut">
               <a:rPr lang="en-US" smtClean="0"/>
-              <a:t>8/17/2018</a:t>
+              <a:t>8/18/2018</a:t>
             </a:fld>
             <a:endParaRPr lang="en-US"/>
           </a:p>
@@ -824,7 +824,7 @@
           <a:p>
             <a:fld id="{554200E8-7467-5347-95AC-7B649ADDE46A}" type="datetimeFigureOut">
               <a:rPr lang="en-US" smtClean="0"/>
-              <a:t>8/17/2018</a:t>
+              <a:t>8/18/2018</a:t>
             </a:fld>
             <a:endParaRPr lang="en-US"/>
           </a:p>
@@ -1070,7 +1070,7 @@
           <a:p>
             <a:fld id="{554200E8-7467-5347-95AC-7B649ADDE46A}" type="datetimeFigureOut">
               <a:rPr lang="en-US" smtClean="0"/>
-              <a:t>8/17/2018</a:t>
+              <a:t>8/18/2018</a:t>
             </a:fld>
             <a:endParaRPr lang="en-US"/>
           </a:p>
@@ -1358,7 +1358,7 @@
           <a:p>
             <a:fld id="{554200E8-7467-5347-95AC-7B649ADDE46A}" type="datetimeFigureOut">
               <a:rPr lang="en-US" smtClean="0"/>
-              <a:t>8/17/2018</a:t>
+              <a:t>8/18/2018</a:t>
             </a:fld>
             <a:endParaRPr lang="en-US"/>
           </a:p>
@@ -1780,7 +1780,7 @@
           <a:p>
             <a:fld id="{554200E8-7467-5347-95AC-7B649ADDE46A}" type="datetimeFigureOut">
               <a:rPr lang="en-US" smtClean="0"/>
-              <a:t>8/17/2018</a:t>
+              <a:t>8/18/2018</a:t>
             </a:fld>
             <a:endParaRPr lang="en-US"/>
           </a:p>
@@ -1898,7 +1898,7 @@
           <a:p>
             <a:fld id="{554200E8-7467-5347-95AC-7B649ADDE46A}" type="datetimeFigureOut">
               <a:rPr lang="en-US" smtClean="0"/>
-              <a:t>8/17/2018</a:t>
+              <a:t>8/18/2018</a:t>
             </a:fld>
             <a:endParaRPr lang="en-US"/>
           </a:p>
@@ -1993,7 +1993,7 @@
           <a:p>
             <a:fld id="{554200E8-7467-5347-95AC-7B649ADDE46A}" type="datetimeFigureOut">
               <a:rPr lang="en-US" smtClean="0"/>
-              <a:t>8/17/2018</a:t>
+              <a:t>8/18/2018</a:t>
             </a:fld>
             <a:endParaRPr lang="en-US"/>
           </a:p>
@@ -2270,7 +2270,7 @@
           <a:p>
             <a:fld id="{554200E8-7467-5347-95AC-7B649ADDE46A}" type="datetimeFigureOut">
               <a:rPr lang="en-US" smtClean="0"/>
-              <a:t>8/17/2018</a:t>
+              <a:t>8/18/2018</a:t>
             </a:fld>
             <a:endParaRPr lang="en-US"/>
           </a:p>
@@ -2523,7 +2523,7 @@
           <a:p>
             <a:fld id="{554200E8-7467-5347-95AC-7B649ADDE46A}" type="datetimeFigureOut">
               <a:rPr lang="en-US" smtClean="0"/>
-              <a:t>8/17/2018</a:t>
+              <a:t>8/18/2018</a:t>
             </a:fld>
             <a:endParaRPr lang="en-US"/>
           </a:p>
@@ -2736,7 +2736,7 @@
           <a:p>
             <a:fld id="{554200E8-7467-5347-95AC-7B649ADDE46A}" type="datetimeFigureOut">
               <a:rPr lang="en-US" smtClean="0"/>
-              <a:t>8/17/2018</a:t>
+              <a:t>8/18/2018</a:t>
             </a:fld>
             <a:endParaRPr lang="en-US"/>
           </a:p>
@@ -3119,7 +3119,7 @@
         </p:nvGrpSpPr>
         <p:grpSpPr>
           <a:xfrm>
-            <a:off x="4818429" y="1441154"/>
+            <a:off x="6536131" y="1818900"/>
             <a:ext cx="1248370" cy="2508715"/>
             <a:chOff x="2103067" y="1657651"/>
             <a:chExt cx="1248370" cy="2508715"/>
@@ -3326,7 +3326,7 @@
             <a:lstStyle/>
             <a:p>
               <a:pPr algn="ctr"/>
-              <a:endParaRPr lang="en-US">
+              <a:endParaRPr lang="en-US" dirty="0">
                 <a:solidFill>
                   <a:schemeClr val="tx1"/>
                 </a:solidFill>
@@ -3416,7 +3416,7 @@
             <a:lstStyle/>
             <a:p>
               <a:pPr algn="ctr"/>
-              <a:endParaRPr lang="en-US">
+              <a:endParaRPr lang="en-US" dirty="0">
                 <a:solidFill>
                   <a:schemeClr val="tx1"/>
                 </a:solidFill>
@@ -3461,7 +3461,7 @@
             <a:lstStyle/>
             <a:p>
               <a:pPr algn="ctr"/>
-              <a:endParaRPr lang="en-US">
+              <a:endParaRPr lang="en-US" dirty="0">
                 <a:solidFill>
                   <a:schemeClr val="tx1"/>
                 </a:solidFill>
@@ -3587,7 +3587,7 @@
             <a:lstStyle/>
             <a:p>
               <a:pPr algn="ctr"/>
-              <a:endParaRPr lang="en-US">
+              <a:endParaRPr lang="en-US" dirty="0">
                 <a:solidFill>
                   <a:schemeClr val="tx1"/>
                 </a:solidFill>
@@ -3817,7 +3817,7 @@
         </p:blipFill>
         <p:spPr>
           <a:xfrm>
-            <a:off x="817146" y="1884548"/>
+            <a:off x="817146" y="1745646"/>
             <a:ext cx="3012352" cy="591382"/>
           </a:xfrm>
           <a:prstGeom prst="rect">
@@ -3825,6 +3825,1305 @@
           </a:prstGeom>
         </p:spPr>
       </p:pic>
+      <p:sp>
+        <p:nvSpPr>
+          <p:cNvPr id="26" name="Curved Up Arrow 13">
+            <a:extLst>
+              <a:ext uri="{FF2B5EF4-FFF2-40B4-BE49-F238E27FC236}">
+                <a16:creationId xmlns:a16="http://schemas.microsoft.com/office/drawing/2014/main" id="{E062B5F1-44EE-41A5-820A-BB4F665C1D00}"/>
+              </a:ext>
+            </a:extLst>
+          </p:cNvPr>
+          <p:cNvSpPr/>
+          <p:nvPr/>
+        </p:nvSpPr>
+        <p:spPr>
+          <a:xfrm>
+            <a:off x="1785920" y="2645958"/>
+            <a:ext cx="1247042" cy="503943"/>
+          </a:xfrm>
+          <a:prstGeom prst="curvedUpArrow">
+            <a:avLst/>
+          </a:prstGeom>
+          <a:solidFill>
+            <a:srgbClr val="FF6600"/>
+          </a:solidFill>
+        </p:spPr>
+        <p:style>
+          <a:lnRef idx="1">
+            <a:schemeClr val="accent1"/>
+          </a:lnRef>
+          <a:fillRef idx="3">
+            <a:schemeClr val="accent1"/>
+          </a:fillRef>
+          <a:effectRef idx="2">
+            <a:schemeClr val="accent1"/>
+          </a:effectRef>
+          <a:fontRef idx="minor">
+            <a:schemeClr val="lt1"/>
+          </a:fontRef>
+        </p:style>
+        <p:txBody>
+          <a:bodyPr rtlCol="0" anchor="ctr"/>
+          <a:lstStyle/>
+          <a:p>
+            <a:pPr algn="ctr"/>
+            <a:endParaRPr lang="en-US" dirty="0">
+              <a:solidFill>
+                <a:schemeClr val="tx1"/>
+              </a:solidFill>
+            </a:endParaRPr>
+          </a:p>
+        </p:txBody>
+      </p:sp>
+      <p:sp>
+        <p:nvSpPr>
+          <p:cNvPr id="3" name="Freeform: Shape 2">
+            <a:extLst>
+              <a:ext uri="{FF2B5EF4-FFF2-40B4-BE49-F238E27FC236}">
+                <a16:creationId xmlns:a16="http://schemas.microsoft.com/office/drawing/2014/main" id="{BA0285F2-BFA9-4A87-A7AB-4012B553A92E}"/>
+              </a:ext>
+            </a:extLst>
+          </p:cNvPr>
+          <p:cNvSpPr/>
+          <p:nvPr/>
+        </p:nvSpPr>
+        <p:spPr>
+          <a:xfrm>
+            <a:off x="2436471" y="1440607"/>
+            <a:ext cx="864000" cy="1089678"/>
+          </a:xfrm>
+          <a:custGeom>
+            <a:avLst/>
+            <a:gdLst>
+              <a:gd name="connsiteX0" fmla="*/ 862314 w 862314"/>
+              <a:gd name="connsiteY0" fmla="*/ 301377 h 1089678"/>
+              <a:gd name="connsiteX1" fmla="*/ 839164 w 862314"/>
+              <a:gd name="connsiteY1" fmla="*/ 255078 h 1089678"/>
+              <a:gd name="connsiteX2" fmla="*/ 729205 w 862314"/>
+              <a:gd name="connsiteY2" fmla="*/ 35159 h 1089678"/>
+              <a:gd name="connsiteX3" fmla="*/ 451413 w 862314"/>
+              <a:gd name="connsiteY3" fmla="*/ 1088456 h 1089678"/>
+              <a:gd name="connsiteX4" fmla="*/ 0 w 862314"/>
+              <a:gd name="connsiteY4" fmla="*/ 202992 h 1089678"/>
+            </a:gdLst>
+            <a:ahLst/>
+            <a:cxnLst>
+              <a:cxn ang="0">
+                <a:pos x="connsiteX0" y="connsiteY0"/>
+              </a:cxn>
+              <a:cxn ang="0">
+                <a:pos x="connsiteX1" y="connsiteY1"/>
+              </a:cxn>
+              <a:cxn ang="0">
+                <a:pos x="connsiteX2" y="connsiteY2"/>
+              </a:cxn>
+              <a:cxn ang="0">
+                <a:pos x="connsiteX3" y="connsiteY3"/>
+              </a:cxn>
+              <a:cxn ang="0">
+                <a:pos x="connsiteX4" y="connsiteY4"/>
+              </a:cxn>
+            </a:cxnLst>
+            <a:rect l="l" t="t" r="r" b="b"/>
+            <a:pathLst>
+              <a:path w="862314" h="1089678">
+                <a:moveTo>
+                  <a:pt x="862314" y="301377"/>
+                </a:moveTo>
+                <a:lnTo>
+                  <a:pt x="839164" y="255078"/>
+                </a:lnTo>
+                <a:cubicBezTo>
+                  <a:pt x="816979" y="210708"/>
+                  <a:pt x="793830" y="-103737"/>
+                  <a:pt x="729205" y="35159"/>
+                </a:cubicBezTo>
+                <a:cubicBezTo>
+                  <a:pt x="664580" y="174055"/>
+                  <a:pt x="572947" y="1060484"/>
+                  <a:pt x="451413" y="1088456"/>
+                </a:cubicBezTo>
+                <a:cubicBezTo>
+                  <a:pt x="329879" y="1116428"/>
+                  <a:pt x="164939" y="659710"/>
+                  <a:pt x="0" y="202992"/>
+                </a:cubicBezTo>
+              </a:path>
+            </a:pathLst>
+          </a:custGeom>
+          <a:noFill/>
+          <a:ln w="76200"/>
+        </p:spPr>
+        <p:style>
+          <a:lnRef idx="1">
+            <a:schemeClr val="accent1"/>
+          </a:lnRef>
+          <a:fillRef idx="3">
+            <a:schemeClr val="accent1"/>
+          </a:fillRef>
+          <a:effectRef idx="2">
+            <a:schemeClr val="accent1"/>
+          </a:effectRef>
+          <a:fontRef idx="minor">
+            <a:schemeClr val="lt1"/>
+          </a:fontRef>
+        </p:style>
+        <p:txBody>
+          <a:bodyPr rtlCol="0" anchor="ctr"/>
+          <a:lstStyle/>
+          <a:p>
+            <a:pPr algn="ctr"/>
+            <a:endParaRPr lang="en-CA"/>
+          </a:p>
+        </p:txBody>
+      </p:sp>
+      <p:sp>
+        <p:nvSpPr>
+          <p:cNvPr id="31" name="Curved Up Arrow 12">
+            <a:extLst>
+              <a:ext uri="{FF2B5EF4-FFF2-40B4-BE49-F238E27FC236}">
+                <a16:creationId xmlns:a16="http://schemas.microsoft.com/office/drawing/2014/main" id="{DD385CE1-2889-4852-9FBC-ACCF0A42B370}"/>
+              </a:ext>
+            </a:extLst>
+          </p:cNvPr>
+          <p:cNvSpPr/>
+          <p:nvPr/>
+        </p:nvSpPr>
+        <p:spPr>
+          <a:xfrm flipH="1">
+            <a:off x="1776302" y="3997330"/>
+            <a:ext cx="1282803" cy="503943"/>
+          </a:xfrm>
+          <a:prstGeom prst="curvedUpArrow">
+            <a:avLst/>
+          </a:prstGeom>
+          <a:solidFill>
+            <a:srgbClr val="FFFF00"/>
+          </a:solidFill>
+        </p:spPr>
+        <p:style>
+          <a:lnRef idx="1">
+            <a:schemeClr val="accent1"/>
+          </a:lnRef>
+          <a:fillRef idx="3">
+            <a:schemeClr val="accent1"/>
+          </a:fillRef>
+          <a:effectRef idx="2">
+            <a:schemeClr val="accent1"/>
+          </a:effectRef>
+          <a:fontRef idx="minor">
+            <a:schemeClr val="lt1"/>
+          </a:fontRef>
+        </p:style>
+        <p:txBody>
+          <a:bodyPr rtlCol="0" anchor="ctr"/>
+          <a:lstStyle/>
+          <a:p>
+            <a:pPr algn="ctr"/>
+            <a:endParaRPr lang="en-US" dirty="0">
+              <a:solidFill>
+                <a:schemeClr val="tx1"/>
+              </a:solidFill>
+            </a:endParaRPr>
+          </a:p>
+        </p:txBody>
+      </p:sp>
+      <p:sp>
+        <p:nvSpPr>
+          <p:cNvPr id="32" name="Freeform: Shape 31">
+            <a:extLst>
+              <a:ext uri="{FF2B5EF4-FFF2-40B4-BE49-F238E27FC236}">
+                <a16:creationId xmlns:a16="http://schemas.microsoft.com/office/drawing/2014/main" id="{A9628D84-B8D9-43C9-814E-F3DB16C6E513}"/>
+              </a:ext>
+            </a:extLst>
+          </p:cNvPr>
+          <p:cNvSpPr/>
+          <p:nvPr/>
+        </p:nvSpPr>
+        <p:spPr>
+          <a:xfrm flipH="1">
+            <a:off x="1342275" y="1458851"/>
+            <a:ext cx="864000" cy="1089678"/>
+          </a:xfrm>
+          <a:custGeom>
+            <a:avLst/>
+            <a:gdLst>
+              <a:gd name="connsiteX0" fmla="*/ 862314 w 862314"/>
+              <a:gd name="connsiteY0" fmla="*/ 301377 h 1089678"/>
+              <a:gd name="connsiteX1" fmla="*/ 839164 w 862314"/>
+              <a:gd name="connsiteY1" fmla="*/ 255078 h 1089678"/>
+              <a:gd name="connsiteX2" fmla="*/ 729205 w 862314"/>
+              <a:gd name="connsiteY2" fmla="*/ 35159 h 1089678"/>
+              <a:gd name="connsiteX3" fmla="*/ 451413 w 862314"/>
+              <a:gd name="connsiteY3" fmla="*/ 1088456 h 1089678"/>
+              <a:gd name="connsiteX4" fmla="*/ 0 w 862314"/>
+              <a:gd name="connsiteY4" fmla="*/ 202992 h 1089678"/>
+            </a:gdLst>
+            <a:ahLst/>
+            <a:cxnLst>
+              <a:cxn ang="0">
+                <a:pos x="connsiteX0" y="connsiteY0"/>
+              </a:cxn>
+              <a:cxn ang="0">
+                <a:pos x="connsiteX1" y="connsiteY1"/>
+              </a:cxn>
+              <a:cxn ang="0">
+                <a:pos x="connsiteX2" y="connsiteY2"/>
+              </a:cxn>
+              <a:cxn ang="0">
+                <a:pos x="connsiteX3" y="connsiteY3"/>
+              </a:cxn>
+              <a:cxn ang="0">
+                <a:pos x="connsiteX4" y="connsiteY4"/>
+              </a:cxn>
+            </a:cxnLst>
+            <a:rect l="l" t="t" r="r" b="b"/>
+            <a:pathLst>
+              <a:path w="862314" h="1089678">
+                <a:moveTo>
+                  <a:pt x="862314" y="301377"/>
+                </a:moveTo>
+                <a:lnTo>
+                  <a:pt x="839164" y="255078"/>
+                </a:lnTo>
+                <a:cubicBezTo>
+                  <a:pt x="816979" y="210708"/>
+                  <a:pt x="793830" y="-103737"/>
+                  <a:pt x="729205" y="35159"/>
+                </a:cubicBezTo>
+                <a:cubicBezTo>
+                  <a:pt x="664580" y="174055"/>
+                  <a:pt x="572947" y="1060484"/>
+                  <a:pt x="451413" y="1088456"/>
+                </a:cubicBezTo>
+                <a:cubicBezTo>
+                  <a:pt x="329879" y="1116428"/>
+                  <a:pt x="164939" y="659710"/>
+                  <a:pt x="0" y="202992"/>
+                </a:cubicBezTo>
+              </a:path>
+            </a:pathLst>
+          </a:custGeom>
+          <a:noFill/>
+          <a:ln w="76200"/>
+        </p:spPr>
+        <p:style>
+          <a:lnRef idx="1">
+            <a:schemeClr val="accent1"/>
+          </a:lnRef>
+          <a:fillRef idx="3">
+            <a:schemeClr val="accent1"/>
+          </a:fillRef>
+          <a:effectRef idx="2">
+            <a:schemeClr val="accent1"/>
+          </a:effectRef>
+          <a:fontRef idx="minor">
+            <a:schemeClr val="lt1"/>
+          </a:fontRef>
+        </p:style>
+        <p:txBody>
+          <a:bodyPr rtlCol="0" anchor="ctr"/>
+          <a:lstStyle/>
+          <a:p>
+            <a:pPr algn="ctr"/>
+            <a:endParaRPr lang="en-CA"/>
+          </a:p>
+        </p:txBody>
+      </p:sp>
+      <p:sp>
+        <p:nvSpPr>
+          <p:cNvPr id="6" name="TextBox 5">
+            <a:extLst>
+              <a:ext uri="{FF2B5EF4-FFF2-40B4-BE49-F238E27FC236}">
+                <a16:creationId xmlns:a16="http://schemas.microsoft.com/office/drawing/2014/main" id="{D1521BF4-5239-472D-9337-8BDDCA7DC703}"/>
+              </a:ext>
+            </a:extLst>
+          </p:cNvPr>
+          <p:cNvSpPr txBox="1"/>
+          <p:nvPr/>
+        </p:nvSpPr>
+        <p:spPr>
+          <a:xfrm>
+            <a:off x="1847955" y="1918226"/>
+            <a:ext cx="381470" cy="246221"/>
+          </a:xfrm>
+          <a:prstGeom prst="rect">
+            <a:avLst/>
+          </a:prstGeom>
+          <a:solidFill>
+            <a:schemeClr val="bg1"/>
+          </a:solidFill>
+        </p:spPr>
+        <p:txBody>
+          <a:bodyPr wrap="square" rtlCol="0">
+            <a:spAutoFit/>
+          </a:bodyPr>
+          <a:lstStyle/>
+          <a:p>
+            <a:r>
+              <a:rPr lang="en-CA" sz="1000" dirty="0"/>
+              <a:t>Asp</a:t>
+            </a:r>
+          </a:p>
+        </p:txBody>
+      </p:sp>
+      <p:sp>
+        <p:nvSpPr>
+          <p:cNvPr id="34" name="TextBox 33">
+            <a:extLst>
+              <a:ext uri="{FF2B5EF4-FFF2-40B4-BE49-F238E27FC236}">
+                <a16:creationId xmlns:a16="http://schemas.microsoft.com/office/drawing/2014/main" id="{FE9C09EE-CED5-4B44-8CCB-0797E89A012F}"/>
+              </a:ext>
+            </a:extLst>
+          </p:cNvPr>
+          <p:cNvSpPr txBox="1"/>
+          <p:nvPr/>
+        </p:nvSpPr>
+        <p:spPr>
+          <a:xfrm>
+            <a:off x="2839933" y="1942504"/>
+            <a:ext cx="381470" cy="246221"/>
+          </a:xfrm>
+          <a:prstGeom prst="rect">
+            <a:avLst/>
+          </a:prstGeom>
+          <a:solidFill>
+            <a:schemeClr val="bg1"/>
+          </a:solidFill>
+        </p:spPr>
+        <p:txBody>
+          <a:bodyPr wrap="square" rtlCol="0">
+            <a:spAutoFit/>
+          </a:bodyPr>
+          <a:lstStyle/>
+          <a:p>
+            <a:r>
+              <a:rPr lang="en-CA" sz="1000" dirty="0"/>
+              <a:t>His</a:t>
+            </a:r>
+          </a:p>
+        </p:txBody>
+      </p:sp>
+      <p:sp>
+        <p:nvSpPr>
+          <p:cNvPr id="38" name="Arrow: Left 37">
+            <a:extLst>
+              <a:ext uri="{FF2B5EF4-FFF2-40B4-BE49-F238E27FC236}">
+                <a16:creationId xmlns:a16="http://schemas.microsoft.com/office/drawing/2014/main" id="{9EE3D85C-3AEF-42FE-977D-B1752A9C61CD}"/>
+              </a:ext>
+            </a:extLst>
+          </p:cNvPr>
+          <p:cNvSpPr/>
+          <p:nvPr/>
+        </p:nvSpPr>
+        <p:spPr>
+          <a:xfrm rot="1543784">
+            <a:off x="3213532" y="2308112"/>
+            <a:ext cx="1012431" cy="237286"/>
+          </a:xfrm>
+          <a:prstGeom prst="leftArrow">
+            <a:avLst>
+              <a:gd name="adj1" fmla="val 28375"/>
+              <a:gd name="adj2" fmla="val 50000"/>
+            </a:avLst>
+          </a:prstGeom>
+          <a:solidFill>
+            <a:schemeClr val="tx1"/>
+          </a:solidFill>
+        </p:spPr>
+        <p:style>
+          <a:lnRef idx="1">
+            <a:schemeClr val="accent1"/>
+          </a:lnRef>
+          <a:fillRef idx="3">
+            <a:schemeClr val="accent1"/>
+          </a:fillRef>
+          <a:effectRef idx="2">
+            <a:schemeClr val="accent1"/>
+          </a:effectRef>
+          <a:fontRef idx="minor">
+            <a:schemeClr val="lt1"/>
+          </a:fontRef>
+        </p:style>
+        <p:txBody>
+          <a:bodyPr rtlCol="0" anchor="ctr"/>
+          <a:lstStyle/>
+          <a:p>
+            <a:pPr algn="ctr"/>
+            <a:endParaRPr lang="en-CA"/>
+          </a:p>
+        </p:txBody>
+      </p:sp>
+      <p:sp>
+        <p:nvSpPr>
+          <p:cNvPr id="42" name="Arrow: Circular 41">
+            <a:extLst>
+              <a:ext uri="{FF2B5EF4-FFF2-40B4-BE49-F238E27FC236}">
+                <a16:creationId xmlns:a16="http://schemas.microsoft.com/office/drawing/2014/main" id="{A4FD4B5E-9331-4C84-955C-342F83EA2760}"/>
+              </a:ext>
+            </a:extLst>
+          </p:cNvPr>
+          <p:cNvSpPr/>
+          <p:nvPr/>
+        </p:nvSpPr>
+        <p:spPr>
+          <a:xfrm flipH="1">
+            <a:off x="2938094" y="2430515"/>
+            <a:ext cx="1651563" cy="1714332"/>
+          </a:xfrm>
+          <a:prstGeom prst="circularArrow">
+            <a:avLst>
+              <a:gd name="adj1" fmla="val 4490"/>
+              <a:gd name="adj2" fmla="val 475818"/>
+              <a:gd name="adj3" fmla="val 17363884"/>
+              <a:gd name="adj4" fmla="val 14243672"/>
+              <a:gd name="adj5" fmla="val 5149"/>
+            </a:avLst>
+          </a:prstGeom>
+          <a:solidFill>
+            <a:schemeClr val="tx1"/>
+          </a:solidFill>
+        </p:spPr>
+        <p:style>
+          <a:lnRef idx="1">
+            <a:schemeClr val="accent1"/>
+          </a:lnRef>
+          <a:fillRef idx="3">
+            <a:schemeClr val="accent1"/>
+          </a:fillRef>
+          <a:effectRef idx="2">
+            <a:schemeClr val="accent1"/>
+          </a:effectRef>
+          <a:fontRef idx="minor">
+            <a:schemeClr val="lt1"/>
+          </a:fontRef>
+        </p:style>
+        <p:txBody>
+          <a:bodyPr rtlCol="0" anchor="ctr"/>
+          <a:lstStyle/>
+          <a:p>
+            <a:pPr algn="ctr"/>
+            <a:endParaRPr lang="en-CA">
+              <a:solidFill>
+                <a:schemeClr val="tx1"/>
+              </a:solidFill>
+            </a:endParaRPr>
+          </a:p>
+        </p:txBody>
+      </p:sp>
+      <p:sp>
+        <p:nvSpPr>
+          <p:cNvPr id="43" name="TextBox 42">
+            <a:extLst>
+              <a:ext uri="{FF2B5EF4-FFF2-40B4-BE49-F238E27FC236}">
+                <a16:creationId xmlns:a16="http://schemas.microsoft.com/office/drawing/2014/main" id="{AE994892-A21A-48B5-8489-6154D74DF333}"/>
+              </a:ext>
+            </a:extLst>
+          </p:cNvPr>
+          <p:cNvSpPr txBox="1"/>
+          <p:nvPr/>
+        </p:nvSpPr>
+        <p:spPr>
+          <a:xfrm>
+            <a:off x="4174601" y="2499016"/>
+            <a:ext cx="556087" cy="369332"/>
+          </a:xfrm>
+          <a:prstGeom prst="rect">
+            <a:avLst/>
+          </a:prstGeom>
+          <a:noFill/>
+        </p:spPr>
+        <p:txBody>
+          <a:bodyPr wrap="square" rtlCol="0">
+            <a:spAutoFit/>
+          </a:bodyPr>
+          <a:lstStyle/>
+          <a:p>
+            <a:r>
+              <a:rPr lang="en-CA" dirty="0"/>
+              <a:t>ATP</a:t>
+            </a:r>
+          </a:p>
+        </p:txBody>
+      </p:sp>
+      <p:sp>
+        <p:nvSpPr>
+          <p:cNvPr id="45" name="TextBox 44">
+            <a:extLst>
+              <a:ext uri="{FF2B5EF4-FFF2-40B4-BE49-F238E27FC236}">
+                <a16:creationId xmlns:a16="http://schemas.microsoft.com/office/drawing/2014/main" id="{C0037868-767F-41DA-A022-D69C9DA0A9F1}"/>
+              </a:ext>
+            </a:extLst>
+          </p:cNvPr>
+          <p:cNvSpPr txBox="1"/>
+          <p:nvPr/>
+        </p:nvSpPr>
+        <p:spPr>
+          <a:xfrm>
+            <a:off x="3121334" y="2614241"/>
+            <a:ext cx="675204" cy="369332"/>
+          </a:xfrm>
+          <a:prstGeom prst="rect">
+            <a:avLst/>
+          </a:prstGeom>
+          <a:noFill/>
+        </p:spPr>
+        <p:txBody>
+          <a:bodyPr wrap="square" rtlCol="0">
+            <a:spAutoFit/>
+          </a:bodyPr>
+          <a:lstStyle/>
+          <a:p>
+            <a:r>
+              <a:rPr lang="en-CA" dirty="0"/>
+              <a:t>ADP</a:t>
+            </a:r>
+          </a:p>
+        </p:txBody>
+      </p:sp>
+      <p:sp>
+        <p:nvSpPr>
+          <p:cNvPr id="46" name="Curved Up Arrow 13">
+            <a:extLst>
+              <a:ext uri="{FF2B5EF4-FFF2-40B4-BE49-F238E27FC236}">
+                <a16:creationId xmlns:a16="http://schemas.microsoft.com/office/drawing/2014/main" id="{589EFB73-8CB8-4FA7-9C2B-642AE25DB1BB}"/>
+              </a:ext>
+            </a:extLst>
+          </p:cNvPr>
+          <p:cNvSpPr/>
+          <p:nvPr/>
+        </p:nvSpPr>
+        <p:spPr>
+          <a:xfrm flipV="1">
+            <a:off x="1812950" y="3149901"/>
+            <a:ext cx="1247042" cy="503943"/>
+          </a:xfrm>
+          <a:prstGeom prst="curvedUpArrow">
+            <a:avLst/>
+          </a:prstGeom>
+          <a:solidFill>
+            <a:srgbClr val="FF6600"/>
+          </a:solidFill>
+        </p:spPr>
+        <p:style>
+          <a:lnRef idx="1">
+            <a:schemeClr val="accent1"/>
+          </a:lnRef>
+          <a:fillRef idx="3">
+            <a:schemeClr val="accent1"/>
+          </a:fillRef>
+          <a:effectRef idx="2">
+            <a:schemeClr val="accent1"/>
+          </a:effectRef>
+          <a:fontRef idx="minor">
+            <a:schemeClr val="lt1"/>
+          </a:fontRef>
+        </p:style>
+        <p:txBody>
+          <a:bodyPr rtlCol="0" anchor="ctr"/>
+          <a:lstStyle/>
+          <a:p>
+            <a:pPr algn="ctr"/>
+            <a:endParaRPr lang="en-US" dirty="0">
+              <a:solidFill>
+                <a:schemeClr val="tx1"/>
+              </a:solidFill>
+            </a:endParaRPr>
+          </a:p>
+        </p:txBody>
+      </p:sp>
+      <p:sp>
+        <p:nvSpPr>
+          <p:cNvPr id="47" name="Curved Up Arrow 12">
+            <a:extLst>
+              <a:ext uri="{FF2B5EF4-FFF2-40B4-BE49-F238E27FC236}">
+                <a16:creationId xmlns:a16="http://schemas.microsoft.com/office/drawing/2014/main" id="{148F0FCC-8B9B-46DF-88BC-A66EB56EE23B}"/>
+              </a:ext>
+            </a:extLst>
+          </p:cNvPr>
+          <p:cNvSpPr/>
+          <p:nvPr/>
+        </p:nvSpPr>
+        <p:spPr>
+          <a:xfrm flipH="1" flipV="1">
+            <a:off x="1784198" y="4521143"/>
+            <a:ext cx="1282803" cy="503943"/>
+          </a:xfrm>
+          <a:prstGeom prst="curvedUpArrow">
+            <a:avLst/>
+          </a:prstGeom>
+          <a:solidFill>
+            <a:srgbClr val="FFFF00"/>
+          </a:solidFill>
+        </p:spPr>
+        <p:style>
+          <a:lnRef idx="1">
+            <a:schemeClr val="accent1"/>
+          </a:lnRef>
+          <a:fillRef idx="3">
+            <a:schemeClr val="accent1"/>
+          </a:fillRef>
+          <a:effectRef idx="2">
+            <a:schemeClr val="accent1"/>
+          </a:effectRef>
+          <a:fontRef idx="minor">
+            <a:schemeClr val="lt1"/>
+          </a:fontRef>
+        </p:style>
+        <p:txBody>
+          <a:bodyPr rtlCol="0" anchor="ctr"/>
+          <a:lstStyle/>
+          <a:p>
+            <a:pPr algn="ctr"/>
+            <a:endParaRPr lang="en-US" dirty="0">
+              <a:solidFill>
+                <a:schemeClr val="tx1"/>
+              </a:solidFill>
+            </a:endParaRPr>
+          </a:p>
+        </p:txBody>
+      </p:sp>
+      <p:sp>
+        <p:nvSpPr>
+          <p:cNvPr id="48" name="Curved Up Arrow 12">
+            <a:extLst>
+              <a:ext uri="{FF2B5EF4-FFF2-40B4-BE49-F238E27FC236}">
+                <a16:creationId xmlns:a16="http://schemas.microsoft.com/office/drawing/2014/main" id="{B8A98870-4970-4F55-B89E-46068B5C48DB}"/>
+              </a:ext>
+            </a:extLst>
+          </p:cNvPr>
+          <p:cNvSpPr/>
+          <p:nvPr/>
+        </p:nvSpPr>
+        <p:spPr>
+          <a:xfrm flipH="1">
+            <a:off x="2015816" y="2214831"/>
+            <a:ext cx="929295" cy="369332"/>
+          </a:xfrm>
+          <a:prstGeom prst="curvedUpArrow">
+            <a:avLst/>
+          </a:prstGeom>
+          <a:solidFill>
+            <a:schemeClr val="bg2"/>
+          </a:solidFill>
+        </p:spPr>
+        <p:style>
+          <a:lnRef idx="1">
+            <a:schemeClr val="accent1"/>
+          </a:lnRef>
+          <a:fillRef idx="3">
+            <a:schemeClr val="accent1"/>
+          </a:fillRef>
+          <a:effectRef idx="2">
+            <a:schemeClr val="accent1"/>
+          </a:effectRef>
+          <a:fontRef idx="minor">
+            <a:schemeClr val="lt1"/>
+          </a:fontRef>
+        </p:style>
+        <p:txBody>
+          <a:bodyPr rtlCol="0" anchor="ctr"/>
+          <a:lstStyle/>
+          <a:p>
+            <a:pPr algn="ctr"/>
+            <a:endParaRPr lang="en-US" dirty="0">
+              <a:solidFill>
+                <a:schemeClr val="tx1"/>
+              </a:solidFill>
+            </a:endParaRPr>
+          </a:p>
+        </p:txBody>
+      </p:sp>
+      <p:sp>
+        <p:nvSpPr>
+          <p:cNvPr id="49" name="TextBox 48">
+            <a:extLst>
+              <a:ext uri="{FF2B5EF4-FFF2-40B4-BE49-F238E27FC236}">
+                <a16:creationId xmlns:a16="http://schemas.microsoft.com/office/drawing/2014/main" id="{8EEDD169-17F1-4C49-AF30-11B5D9FA4C36}"/>
+              </a:ext>
+            </a:extLst>
+          </p:cNvPr>
+          <p:cNvSpPr txBox="1"/>
+          <p:nvPr/>
+        </p:nvSpPr>
+        <p:spPr>
+          <a:xfrm>
+            <a:off x="2292670" y="2211003"/>
+            <a:ext cx="381965" cy="369332"/>
+          </a:xfrm>
+          <a:prstGeom prst="rect">
+            <a:avLst/>
+          </a:prstGeom>
+          <a:noFill/>
+        </p:spPr>
+        <p:txBody>
+          <a:bodyPr wrap="square" rtlCol="0">
+            <a:spAutoFit/>
+          </a:bodyPr>
+          <a:lstStyle/>
+          <a:p>
+            <a:r>
+              <a:rPr lang="en-CA" dirty="0"/>
+              <a:t>P</a:t>
+            </a:r>
+            <a:r>
+              <a:rPr lang="en-CA" baseline="-25000" dirty="0"/>
+              <a:t>i</a:t>
+            </a:r>
+          </a:p>
+        </p:txBody>
+      </p:sp>
+      <p:sp>
+        <p:nvSpPr>
+          <p:cNvPr id="51" name="TextBox 50">
+            <a:extLst>
+              <a:ext uri="{FF2B5EF4-FFF2-40B4-BE49-F238E27FC236}">
+                <a16:creationId xmlns:a16="http://schemas.microsoft.com/office/drawing/2014/main" id="{24D5DE0B-D86F-400E-995C-432E2E480131}"/>
+              </a:ext>
+            </a:extLst>
+          </p:cNvPr>
+          <p:cNvSpPr txBox="1"/>
+          <p:nvPr/>
+        </p:nvSpPr>
+        <p:spPr>
+          <a:xfrm>
+            <a:off x="1071806" y="2262701"/>
+            <a:ext cx="655817" cy="369332"/>
+          </a:xfrm>
+          <a:prstGeom prst="rect">
+            <a:avLst/>
+          </a:prstGeom>
+          <a:noFill/>
+        </p:spPr>
+        <p:txBody>
+          <a:bodyPr wrap="square" rtlCol="0">
+            <a:spAutoFit/>
+          </a:bodyPr>
+          <a:lstStyle/>
+          <a:p>
+            <a:r>
+              <a:rPr lang="en-CA" dirty="0"/>
+              <a:t>Sln1</a:t>
+            </a:r>
+          </a:p>
+        </p:txBody>
+      </p:sp>
+      <p:sp>
+        <p:nvSpPr>
+          <p:cNvPr id="52" name="TextBox 51">
+            <a:extLst>
+              <a:ext uri="{FF2B5EF4-FFF2-40B4-BE49-F238E27FC236}">
+                <a16:creationId xmlns:a16="http://schemas.microsoft.com/office/drawing/2014/main" id="{44ACD8B8-2B57-4FAB-9049-F711C12417CB}"/>
+              </a:ext>
+            </a:extLst>
+          </p:cNvPr>
+          <p:cNvSpPr txBox="1"/>
+          <p:nvPr/>
+        </p:nvSpPr>
+        <p:spPr>
+          <a:xfrm>
+            <a:off x="2063105" y="2717199"/>
+            <a:ext cx="381965" cy="369332"/>
+          </a:xfrm>
+          <a:prstGeom prst="rect">
+            <a:avLst/>
+          </a:prstGeom>
+          <a:noFill/>
+        </p:spPr>
+        <p:txBody>
+          <a:bodyPr wrap="square" rtlCol="0">
+            <a:spAutoFit/>
+          </a:bodyPr>
+          <a:lstStyle/>
+          <a:p>
+            <a:r>
+              <a:rPr lang="en-CA" dirty="0"/>
+              <a:t>P</a:t>
+            </a:r>
+            <a:r>
+              <a:rPr lang="en-CA" baseline="-25000" dirty="0"/>
+              <a:t>i</a:t>
+            </a:r>
+          </a:p>
+        </p:txBody>
+      </p:sp>
+      <p:sp>
+        <p:nvSpPr>
+          <p:cNvPr id="53" name="TextBox 52">
+            <a:extLst>
+              <a:ext uri="{FF2B5EF4-FFF2-40B4-BE49-F238E27FC236}">
+                <a16:creationId xmlns:a16="http://schemas.microsoft.com/office/drawing/2014/main" id="{254F83C9-72A5-4742-BF21-0D5ACCFCB9E7}"/>
+              </a:ext>
+            </a:extLst>
+          </p:cNvPr>
+          <p:cNvSpPr txBox="1"/>
+          <p:nvPr/>
+        </p:nvSpPr>
+        <p:spPr>
+          <a:xfrm>
+            <a:off x="1573608" y="3635307"/>
+            <a:ext cx="655817" cy="369332"/>
+          </a:xfrm>
+          <a:prstGeom prst="rect">
+            <a:avLst/>
+          </a:prstGeom>
+          <a:noFill/>
+        </p:spPr>
+        <p:txBody>
+          <a:bodyPr wrap="square" rtlCol="0">
+            <a:spAutoFit/>
+          </a:bodyPr>
+          <a:lstStyle/>
+          <a:p>
+            <a:r>
+              <a:rPr lang="en-CA" dirty="0"/>
+              <a:t>Ypd1</a:t>
+            </a:r>
+          </a:p>
+        </p:txBody>
+      </p:sp>
+      <p:sp>
+        <p:nvSpPr>
+          <p:cNvPr id="54" name="TextBox 53">
+            <a:extLst>
+              <a:ext uri="{FF2B5EF4-FFF2-40B4-BE49-F238E27FC236}">
+                <a16:creationId xmlns:a16="http://schemas.microsoft.com/office/drawing/2014/main" id="{0B2ADEB8-1197-4F0D-9F9F-6DCF49A67BD9}"/>
+              </a:ext>
+            </a:extLst>
+          </p:cNvPr>
+          <p:cNvSpPr txBox="1"/>
+          <p:nvPr/>
+        </p:nvSpPr>
+        <p:spPr>
+          <a:xfrm>
+            <a:off x="2659069" y="3650856"/>
+            <a:ext cx="833454" cy="369332"/>
+          </a:xfrm>
+          <a:prstGeom prst="rect">
+            <a:avLst/>
+          </a:prstGeom>
+          <a:noFill/>
+        </p:spPr>
+        <p:txBody>
+          <a:bodyPr wrap="square" rtlCol="0">
+            <a:spAutoFit/>
+          </a:bodyPr>
+          <a:lstStyle/>
+          <a:p>
+            <a:r>
+              <a:rPr lang="en-CA" dirty="0"/>
+              <a:t>Ypd1-P</a:t>
+            </a:r>
+          </a:p>
+        </p:txBody>
+      </p:sp>
+      <p:sp>
+        <p:nvSpPr>
+          <p:cNvPr id="62" name="Arrow: Circular 61">
+            <a:extLst>
+              <a:ext uri="{FF2B5EF4-FFF2-40B4-BE49-F238E27FC236}">
+                <a16:creationId xmlns:a16="http://schemas.microsoft.com/office/drawing/2014/main" id="{BB0299B7-71D5-4821-A719-090948D69959}"/>
+              </a:ext>
+            </a:extLst>
+          </p:cNvPr>
+          <p:cNvSpPr/>
+          <p:nvPr/>
+        </p:nvSpPr>
+        <p:spPr>
+          <a:xfrm>
+            <a:off x="857235" y="5477027"/>
+            <a:ext cx="1651563" cy="1714332"/>
+          </a:xfrm>
+          <a:prstGeom prst="circularArrow">
+            <a:avLst>
+              <a:gd name="adj1" fmla="val 5104"/>
+              <a:gd name="adj2" fmla="val 665864"/>
+              <a:gd name="adj3" fmla="val 20572001"/>
+              <a:gd name="adj4" fmla="val 18238437"/>
+              <a:gd name="adj5" fmla="val 6161"/>
+            </a:avLst>
+          </a:prstGeom>
+          <a:solidFill>
+            <a:schemeClr val="accent5"/>
+          </a:solidFill>
+        </p:spPr>
+        <p:style>
+          <a:lnRef idx="1">
+            <a:schemeClr val="accent1"/>
+          </a:lnRef>
+          <a:fillRef idx="3">
+            <a:schemeClr val="accent1"/>
+          </a:fillRef>
+          <a:effectRef idx="2">
+            <a:schemeClr val="accent1"/>
+          </a:effectRef>
+          <a:fontRef idx="minor">
+            <a:schemeClr val="lt1"/>
+          </a:fontRef>
+        </p:style>
+        <p:txBody>
+          <a:bodyPr rtlCol="0" anchor="ctr"/>
+          <a:lstStyle/>
+          <a:p>
+            <a:pPr algn="ctr"/>
+            <a:endParaRPr lang="en-CA">
+              <a:solidFill>
+                <a:schemeClr val="tx1"/>
+              </a:solidFill>
+            </a:endParaRPr>
+          </a:p>
+        </p:txBody>
+      </p:sp>
+      <p:sp>
+        <p:nvSpPr>
+          <p:cNvPr id="56" name="Curved Up Arrow 13">
+            <a:extLst>
+              <a:ext uri="{FF2B5EF4-FFF2-40B4-BE49-F238E27FC236}">
+                <a16:creationId xmlns:a16="http://schemas.microsoft.com/office/drawing/2014/main" id="{BB7CA639-10B1-4C69-9D7B-AB3A669C662D}"/>
+              </a:ext>
+            </a:extLst>
+          </p:cNvPr>
+          <p:cNvSpPr/>
+          <p:nvPr/>
+        </p:nvSpPr>
+        <p:spPr>
+          <a:xfrm>
+            <a:off x="1895262" y="5372185"/>
+            <a:ext cx="1247042" cy="503943"/>
+          </a:xfrm>
+          <a:prstGeom prst="curvedUpArrow">
+            <a:avLst/>
+          </a:prstGeom>
+          <a:solidFill>
+            <a:schemeClr val="accent5"/>
+          </a:solidFill>
+        </p:spPr>
+        <p:style>
+          <a:lnRef idx="1">
+            <a:schemeClr val="accent1"/>
+          </a:lnRef>
+          <a:fillRef idx="3">
+            <a:schemeClr val="accent1"/>
+          </a:fillRef>
+          <a:effectRef idx="2">
+            <a:schemeClr val="accent1"/>
+          </a:effectRef>
+          <a:fontRef idx="minor">
+            <a:schemeClr val="lt1"/>
+          </a:fontRef>
+        </p:style>
+        <p:txBody>
+          <a:bodyPr rtlCol="0" anchor="ctr"/>
+          <a:lstStyle/>
+          <a:p>
+            <a:pPr algn="ctr"/>
+            <a:endParaRPr lang="en-US" dirty="0">
+              <a:solidFill>
+                <a:schemeClr val="tx1"/>
+              </a:solidFill>
+            </a:endParaRPr>
+          </a:p>
+        </p:txBody>
+      </p:sp>
+      <p:sp>
+        <p:nvSpPr>
+          <p:cNvPr id="57" name="TextBox 56">
+            <a:extLst>
+              <a:ext uri="{FF2B5EF4-FFF2-40B4-BE49-F238E27FC236}">
+                <a16:creationId xmlns:a16="http://schemas.microsoft.com/office/drawing/2014/main" id="{B43CA1F0-D5B2-4992-A856-97BC411C2B5E}"/>
+              </a:ext>
+            </a:extLst>
+          </p:cNvPr>
+          <p:cNvSpPr txBox="1"/>
+          <p:nvPr/>
+        </p:nvSpPr>
+        <p:spPr>
+          <a:xfrm>
+            <a:off x="1511283" y="5022529"/>
+            <a:ext cx="823523" cy="369332"/>
+          </a:xfrm>
+          <a:prstGeom prst="rect">
+            <a:avLst/>
+          </a:prstGeom>
+          <a:noFill/>
+        </p:spPr>
+        <p:txBody>
+          <a:bodyPr wrap="square" rtlCol="0">
+            <a:spAutoFit/>
+          </a:bodyPr>
+          <a:lstStyle/>
+          <a:p>
+            <a:r>
+              <a:rPr lang="en-CA" dirty="0"/>
+              <a:t>Ssk1-P</a:t>
+            </a:r>
+          </a:p>
+        </p:txBody>
+      </p:sp>
+      <p:sp>
+        <p:nvSpPr>
+          <p:cNvPr id="58" name="TextBox 57">
+            <a:extLst>
+              <a:ext uri="{FF2B5EF4-FFF2-40B4-BE49-F238E27FC236}">
+                <a16:creationId xmlns:a16="http://schemas.microsoft.com/office/drawing/2014/main" id="{BC0F6F7E-35BD-4014-9EF6-E0FD583FC81C}"/>
+              </a:ext>
+            </a:extLst>
+          </p:cNvPr>
+          <p:cNvSpPr txBox="1"/>
+          <p:nvPr/>
+        </p:nvSpPr>
+        <p:spPr>
+          <a:xfrm>
+            <a:off x="2702759" y="5022961"/>
+            <a:ext cx="655817" cy="369332"/>
+          </a:xfrm>
+          <a:prstGeom prst="rect">
+            <a:avLst/>
+          </a:prstGeom>
+          <a:noFill/>
+        </p:spPr>
+        <p:txBody>
+          <a:bodyPr wrap="square" rtlCol="0">
+            <a:spAutoFit/>
+          </a:bodyPr>
+          <a:lstStyle/>
+          <a:p>
+            <a:r>
+              <a:rPr lang="en-CA" dirty="0"/>
+              <a:t>Ssk1</a:t>
+            </a:r>
+          </a:p>
+        </p:txBody>
+      </p:sp>
+      <p:sp>
+        <p:nvSpPr>
+          <p:cNvPr id="59" name="Arrow: Right 58">
+            <a:extLst>
+              <a:ext uri="{FF2B5EF4-FFF2-40B4-BE49-F238E27FC236}">
+                <a16:creationId xmlns:a16="http://schemas.microsoft.com/office/drawing/2014/main" id="{F554C43C-9F41-4EAE-A25D-F8424F3E9482}"/>
+              </a:ext>
+            </a:extLst>
+          </p:cNvPr>
+          <p:cNvSpPr/>
+          <p:nvPr/>
+        </p:nvSpPr>
+        <p:spPr>
+          <a:xfrm>
+            <a:off x="3285395" y="5050549"/>
+            <a:ext cx="742595" cy="369331"/>
+          </a:xfrm>
+          <a:prstGeom prst="rightArrow">
+            <a:avLst/>
+          </a:prstGeom>
+          <a:solidFill>
+            <a:schemeClr val="tx1"/>
+          </a:solidFill>
+        </p:spPr>
+        <p:style>
+          <a:lnRef idx="1">
+            <a:schemeClr val="accent1"/>
+          </a:lnRef>
+          <a:fillRef idx="3">
+            <a:schemeClr val="accent1"/>
+          </a:fillRef>
+          <a:effectRef idx="2">
+            <a:schemeClr val="accent1"/>
+          </a:effectRef>
+          <a:fontRef idx="minor">
+            <a:schemeClr val="lt1"/>
+          </a:fontRef>
+        </p:style>
+        <p:txBody>
+          <a:bodyPr rtlCol="0" anchor="ctr"/>
+          <a:lstStyle/>
+          <a:p>
+            <a:pPr algn="ctr"/>
+            <a:endParaRPr lang="en-CA"/>
+          </a:p>
+        </p:txBody>
+      </p:sp>
+      <p:sp>
+        <p:nvSpPr>
+          <p:cNvPr id="60" name="TextBox 59">
+            <a:extLst>
+              <a:ext uri="{FF2B5EF4-FFF2-40B4-BE49-F238E27FC236}">
+                <a16:creationId xmlns:a16="http://schemas.microsoft.com/office/drawing/2014/main" id="{2E467851-ACD1-4431-8AA2-7D9C2F6E98FF}"/>
+              </a:ext>
+            </a:extLst>
+          </p:cNvPr>
+          <p:cNvSpPr txBox="1"/>
+          <p:nvPr/>
+        </p:nvSpPr>
+        <p:spPr>
+          <a:xfrm>
+            <a:off x="4053455" y="4912048"/>
+            <a:ext cx="857455" cy="646331"/>
+          </a:xfrm>
+          <a:prstGeom prst="rect">
+            <a:avLst/>
+          </a:prstGeom>
+          <a:noFill/>
+        </p:spPr>
+        <p:txBody>
+          <a:bodyPr wrap="square" rtlCol="0">
+            <a:spAutoFit/>
+          </a:bodyPr>
+          <a:lstStyle/>
+          <a:p>
+            <a:r>
+              <a:rPr lang="en-CA" dirty="0"/>
+              <a:t>Output signal</a:t>
+            </a:r>
+          </a:p>
+        </p:txBody>
+      </p:sp>
+      <p:sp>
+        <p:nvSpPr>
+          <p:cNvPr id="63" name="TextBox 62">
+            <a:extLst>
+              <a:ext uri="{FF2B5EF4-FFF2-40B4-BE49-F238E27FC236}">
+                <a16:creationId xmlns:a16="http://schemas.microsoft.com/office/drawing/2014/main" id="{5A5778E4-0DC7-48AC-AB51-DB056935C858}"/>
+              </a:ext>
+            </a:extLst>
+          </p:cNvPr>
+          <p:cNvSpPr txBox="1"/>
+          <p:nvPr/>
+        </p:nvSpPr>
+        <p:spPr>
+          <a:xfrm>
+            <a:off x="2444795" y="6097315"/>
+            <a:ext cx="381965" cy="369332"/>
+          </a:xfrm>
+          <a:prstGeom prst="rect">
+            <a:avLst/>
+          </a:prstGeom>
+          <a:noFill/>
+        </p:spPr>
+        <p:txBody>
+          <a:bodyPr wrap="square" rtlCol="0">
+            <a:spAutoFit/>
+          </a:bodyPr>
+          <a:lstStyle/>
+          <a:p>
+            <a:r>
+              <a:rPr lang="en-CA" dirty="0"/>
+              <a:t>P</a:t>
+            </a:r>
+            <a:r>
+              <a:rPr lang="en-CA" baseline="-25000" dirty="0"/>
+              <a:t>i</a:t>
+            </a:r>
+          </a:p>
+        </p:txBody>
+      </p:sp>
+      <p:cxnSp>
+        <p:nvCxnSpPr>
+          <p:cNvPr id="65" name="Straight Connector 64">
+            <a:extLst>
+              <a:ext uri="{FF2B5EF4-FFF2-40B4-BE49-F238E27FC236}">
+                <a16:creationId xmlns:a16="http://schemas.microsoft.com/office/drawing/2014/main" id="{2752AB46-7E87-4266-A984-7F02A4FCE5B1}"/>
+              </a:ext>
+            </a:extLst>
+          </p:cNvPr>
+          <p:cNvCxnSpPr/>
+          <p:nvPr/>
+        </p:nvCxnSpPr>
+        <p:spPr>
+          <a:xfrm>
+            <a:off x="2141316" y="1458851"/>
+            <a:ext cx="445626" cy="0"/>
+          </a:xfrm>
+          <a:prstGeom prst="line">
+            <a:avLst/>
+          </a:prstGeom>
+        </p:spPr>
+        <p:style>
+          <a:lnRef idx="2">
+            <a:schemeClr val="dk1"/>
+          </a:lnRef>
+          <a:fillRef idx="0">
+            <a:schemeClr val="dk1"/>
+          </a:fillRef>
+          <a:effectRef idx="1">
+            <a:schemeClr val="dk1"/>
+          </a:effectRef>
+          <a:fontRef idx="minor">
+            <a:schemeClr val="tx1"/>
+          </a:fontRef>
+        </p:style>
+      </p:cxnSp>
+      <p:cxnSp>
+        <p:nvCxnSpPr>
+          <p:cNvPr id="67" name="Straight Connector 66">
+            <a:extLst>
+              <a:ext uri="{FF2B5EF4-FFF2-40B4-BE49-F238E27FC236}">
+                <a16:creationId xmlns:a16="http://schemas.microsoft.com/office/drawing/2014/main" id="{0EC0F2E0-C5AB-47F8-B96B-DEAE354C101C}"/>
+              </a:ext>
+            </a:extLst>
+          </p:cNvPr>
+          <p:cNvCxnSpPr/>
+          <p:nvPr/>
+        </p:nvCxnSpPr>
+        <p:spPr>
+          <a:xfrm flipV="1">
+            <a:off x="2409441" y="908613"/>
+            <a:ext cx="417319" cy="550238"/>
+          </a:xfrm>
+          <a:prstGeom prst="line">
+            <a:avLst/>
+          </a:prstGeom>
+        </p:spPr>
+        <p:style>
+          <a:lnRef idx="2">
+            <a:schemeClr val="dk1"/>
+          </a:lnRef>
+          <a:fillRef idx="0">
+            <a:schemeClr val="dk1"/>
+          </a:fillRef>
+          <a:effectRef idx="1">
+            <a:schemeClr val="dk1"/>
+          </a:effectRef>
+          <a:fontRef idx="minor">
+            <a:schemeClr val="tx1"/>
+          </a:fontRef>
+        </p:style>
+      </p:cxnSp>
+      <p:sp>
+        <p:nvSpPr>
+          <p:cNvPr id="68" name="TextBox 67">
+            <a:extLst>
+              <a:ext uri="{FF2B5EF4-FFF2-40B4-BE49-F238E27FC236}">
+                <a16:creationId xmlns:a16="http://schemas.microsoft.com/office/drawing/2014/main" id="{D6A0F79A-DE90-455A-98A0-95F5A17308AE}"/>
+              </a:ext>
+            </a:extLst>
+          </p:cNvPr>
+          <p:cNvSpPr txBox="1"/>
+          <p:nvPr/>
+        </p:nvSpPr>
+        <p:spPr>
+          <a:xfrm>
+            <a:off x="2069737" y="569638"/>
+            <a:ext cx="1694138" cy="369332"/>
+          </a:xfrm>
+          <a:prstGeom prst="rect">
+            <a:avLst/>
+          </a:prstGeom>
+          <a:noFill/>
+        </p:spPr>
+        <p:txBody>
+          <a:bodyPr wrap="square" rtlCol="0">
+            <a:spAutoFit/>
+          </a:bodyPr>
+          <a:lstStyle/>
+          <a:p>
+            <a:r>
+              <a:rPr lang="en-CA" dirty="0"/>
+              <a:t>High osmolarity</a:t>
+            </a:r>
+          </a:p>
+        </p:txBody>
+      </p:sp>
     </p:spTree>
     <p:extLst>
       <p:ext uri="{BB962C8B-B14F-4D97-AF65-F5344CB8AC3E}">

</xml_diff>